<commit_message>
tab data exploration page
</commit_message>
<xml_diff>
--- a/inst/shinyApp/www/wide2long.pptx
+++ b/inst/shinyApp/www/wide2long.pptx
@@ -108,11 +108,6 @@
     <p:ext uri="{EFAFB233-063F-42B5-8137-9DF3F51BA10A}">
       <p15:sldGuideLst xmlns:p15="http://schemas.microsoft.com/office/powerpoint/2012/main">
         <p15:guide id="2" userDrawn="1">
-          <p15:clr>
-            <a:srgbClr val="A4A3A4"/>
-          </p15:clr>
-        </p15:guide>
-        <p15:guide id="3" orient="horz" pos="2035">
           <p15:clr>
             <a:srgbClr val="A4A3A4"/>
           </p15:clr>

</xml_diff>